<commit_message>
Lots of updated shiiiiiiit
</commit_message>
<xml_diff>
--- a/Administration/quadchart.pptx
+++ b/Administration/quadchart.pptx
@@ -288,7 +288,7 @@
           <a:p>
             <a:fld id="{33508700-34BC-8E4C-A60A-64E4DD6311BC}" type="datetimeFigureOut">
               <a:rPr lang="en-US" smtClean="0"/>
-              <a:t>10/27/15</a:t>
+              <a:t>11/17/15</a:t>
             </a:fld>
             <a:endParaRPr lang="en-US"/>
           </a:p>
@@ -458,7 +458,7 @@
           <a:p>
             <a:fld id="{33508700-34BC-8E4C-A60A-64E4DD6311BC}" type="datetimeFigureOut">
               <a:rPr lang="en-US" smtClean="0"/>
-              <a:t>10/27/15</a:t>
+              <a:t>11/17/15</a:t>
             </a:fld>
             <a:endParaRPr lang="en-US"/>
           </a:p>
@@ -638,7 +638,7 @@
           <a:p>
             <a:fld id="{33508700-34BC-8E4C-A60A-64E4DD6311BC}" type="datetimeFigureOut">
               <a:rPr lang="en-US" smtClean="0"/>
-              <a:t>10/27/15</a:t>
+              <a:t>11/17/15</a:t>
             </a:fld>
             <a:endParaRPr lang="en-US"/>
           </a:p>
@@ -808,7 +808,7 @@
           <a:p>
             <a:fld id="{33508700-34BC-8E4C-A60A-64E4DD6311BC}" type="datetimeFigureOut">
               <a:rPr lang="en-US" smtClean="0"/>
-              <a:t>10/27/15</a:t>
+              <a:t>11/17/15</a:t>
             </a:fld>
             <a:endParaRPr lang="en-US"/>
           </a:p>
@@ -1054,7 +1054,7 @@
           <a:p>
             <a:fld id="{33508700-34BC-8E4C-A60A-64E4DD6311BC}" type="datetimeFigureOut">
               <a:rPr lang="en-US" smtClean="0"/>
-              <a:t>10/27/15</a:t>
+              <a:t>11/17/15</a:t>
             </a:fld>
             <a:endParaRPr lang="en-US"/>
           </a:p>
@@ -1342,7 +1342,7 @@
           <a:p>
             <a:fld id="{33508700-34BC-8E4C-A60A-64E4DD6311BC}" type="datetimeFigureOut">
               <a:rPr lang="en-US" smtClean="0"/>
-              <a:t>10/27/15</a:t>
+              <a:t>11/17/15</a:t>
             </a:fld>
             <a:endParaRPr lang="en-US"/>
           </a:p>
@@ -1764,7 +1764,7 @@
           <a:p>
             <a:fld id="{33508700-34BC-8E4C-A60A-64E4DD6311BC}" type="datetimeFigureOut">
               <a:rPr lang="en-US" smtClean="0"/>
-              <a:t>10/27/15</a:t>
+              <a:t>11/17/15</a:t>
             </a:fld>
             <a:endParaRPr lang="en-US"/>
           </a:p>
@@ -1882,7 +1882,7 @@
           <a:p>
             <a:fld id="{33508700-34BC-8E4C-A60A-64E4DD6311BC}" type="datetimeFigureOut">
               <a:rPr lang="en-US" smtClean="0"/>
-              <a:t>10/27/15</a:t>
+              <a:t>11/17/15</a:t>
             </a:fld>
             <a:endParaRPr lang="en-US"/>
           </a:p>
@@ -1977,7 +1977,7 @@
           <a:p>
             <a:fld id="{33508700-34BC-8E4C-A60A-64E4DD6311BC}" type="datetimeFigureOut">
               <a:rPr lang="en-US" smtClean="0"/>
-              <a:t>10/27/15</a:t>
+              <a:t>11/17/15</a:t>
             </a:fld>
             <a:endParaRPr lang="en-US"/>
           </a:p>
@@ -2254,7 +2254,7 @@
           <a:p>
             <a:fld id="{33508700-34BC-8E4C-A60A-64E4DD6311BC}" type="datetimeFigureOut">
               <a:rPr lang="en-US" smtClean="0"/>
-              <a:t>10/27/15</a:t>
+              <a:t>11/17/15</a:t>
             </a:fld>
             <a:endParaRPr lang="en-US"/>
           </a:p>
@@ -2507,7 +2507,7 @@
           <a:p>
             <a:fld id="{33508700-34BC-8E4C-A60A-64E4DD6311BC}" type="datetimeFigureOut">
               <a:rPr lang="en-US" smtClean="0"/>
-              <a:t>10/27/15</a:t>
+              <a:t>11/17/15</a:t>
             </a:fld>
             <a:endParaRPr lang="en-US"/>
           </a:p>
@@ -2720,7 +2720,7 @@
           <a:p>
             <a:fld id="{33508700-34BC-8E4C-A60A-64E4DD6311BC}" type="datetimeFigureOut">
               <a:rPr lang="en-US" smtClean="0"/>
-              <a:t>10/27/15</a:t>
+              <a:t>11/17/15</a:t>
             </a:fld>
             <a:endParaRPr lang="en-US"/>
           </a:p>
@@ -3386,7 +3386,7 @@
         <p:spPr>
           <a:xfrm>
             <a:off x="0" y="859597"/>
-            <a:ext cx="4561476" cy="369332"/>
+            <a:ext cx="4561476" cy="1477328"/>
           </a:xfrm>
           <a:prstGeom prst="rect">
             <a:avLst/>
@@ -3404,13 +3404,79 @@
                 <a:latin typeface="Candara"/>
                 <a:cs typeface="Candara"/>
               </a:rPr>
-              <a:t>Big Picture Task</a:t>
-            </a:r>
-            <a:endParaRPr lang="en-US" dirty="0" smtClean="0">
+              <a:t>Big Picture </a:t>
+            </a:r>
+            <a:r>
+              <a:rPr lang="en-US" dirty="0" smtClean="0">
+                <a:latin typeface="Candara"/>
+                <a:cs typeface="Candara"/>
+              </a:rPr>
+              <a:t>Task</a:t>
+            </a:r>
+          </a:p>
+          <a:p>
+            <a:endParaRPr lang="en-US" dirty="0">
               <a:latin typeface="Candara"/>
               <a:cs typeface="Candara"/>
             </a:endParaRPr>
           </a:p>
+          <a:p>
+            <a:pPr marL="285750" indent="-285750">
+              <a:buFont typeface="Arial"/>
+              <a:buChar char="•"/>
+            </a:pPr>
+            <a:r>
+              <a:rPr lang="en-US" dirty="0" smtClean="0">
+                <a:latin typeface="Candara"/>
+                <a:cs typeface="Candara"/>
+              </a:rPr>
+              <a:t>Have the </a:t>
+            </a:r>
+            <a:r>
+              <a:rPr lang="en-US" dirty="0" err="1" smtClean="0">
+                <a:latin typeface="Candara"/>
+                <a:cs typeface="Candara"/>
+              </a:rPr>
+              <a:t>quadrotor</a:t>
+            </a:r>
+            <a:r>
+              <a:rPr lang="en-US" dirty="0" smtClean="0">
+                <a:latin typeface="Candara"/>
+                <a:cs typeface="Candara"/>
+              </a:rPr>
+              <a:t> fly reliably indoors</a:t>
+            </a:r>
+            <a:endParaRPr lang="en-US" dirty="0">
+              <a:latin typeface="Candara"/>
+              <a:cs typeface="Candara"/>
+            </a:endParaRPr>
+          </a:p>
+          <a:p>
+            <a:pPr marL="285750" indent="-285750">
+              <a:buFont typeface="Arial"/>
+              <a:buChar char="•"/>
+            </a:pPr>
+            <a:r>
+              <a:rPr lang="en-US" dirty="0" smtClean="0">
+                <a:latin typeface="Candara"/>
+                <a:cs typeface="Candara"/>
+              </a:rPr>
+              <a:t>Follow a given set of waypoints</a:t>
+            </a:r>
+          </a:p>
+          <a:p>
+            <a:pPr marL="285750" indent="-285750">
+              <a:buFont typeface="Arial"/>
+              <a:buChar char="•"/>
+            </a:pPr>
+            <a:r>
+              <a:rPr lang="en-US" dirty="0" smtClean="0">
+                <a:latin typeface="Candara"/>
+                <a:cs typeface="Candara"/>
+              </a:rPr>
+              <a:t>Station-keep reliably </a:t>
+            </a:r>
+          </a:p>
         </p:txBody>
       </p:sp>
       <p:sp>
@@ -3422,7 +3488,7 @@
         <p:spPr>
           <a:xfrm>
             <a:off x="4561476" y="850054"/>
-            <a:ext cx="4582523" cy="369332"/>
+            <a:ext cx="4582523" cy="1200329"/>
           </a:xfrm>
           <a:prstGeom prst="rect">
             <a:avLst/>
@@ -3442,11 +3508,57 @@
               </a:rPr>
               <a:t>Progress</a:t>
             </a:r>
+          </a:p>
+          <a:p>
             <a:endParaRPr lang="en-US" dirty="0" smtClean="0">
               <a:latin typeface="Candara"/>
               <a:cs typeface="Candara"/>
             </a:endParaRPr>
           </a:p>
+          <a:p>
+            <a:pPr marL="285750" indent="-285750">
+              <a:buFont typeface="Arial"/>
+              <a:buChar char="•"/>
+            </a:pPr>
+            <a:r>
+              <a:rPr lang="en-US" dirty="0" smtClean="0">
+                <a:latin typeface="Candara"/>
+                <a:cs typeface="Candara"/>
+              </a:rPr>
+              <a:t>Station-keeping at origin reliably </a:t>
+            </a:r>
+          </a:p>
+          <a:p>
+            <a:pPr marL="285750" indent="-285750">
+              <a:buFont typeface="Arial"/>
+              <a:buChar char="•"/>
+            </a:pPr>
+            <a:r>
+              <a:rPr lang="en-US" dirty="0" smtClean="0">
+                <a:latin typeface="Candara"/>
+                <a:cs typeface="Candara"/>
+              </a:rPr>
+              <a:t>Non-origin </a:t>
+            </a:r>
+            <a:r>
+              <a:rPr lang="en-US" dirty="0" err="1" smtClean="0">
+                <a:latin typeface="Candara"/>
+                <a:cs typeface="Candara"/>
+              </a:rPr>
+              <a:t>setpoints</a:t>
+            </a:r>
+            <a:r>
+              <a:rPr lang="en-US" dirty="0" smtClean="0">
+                <a:latin typeface="Candara"/>
+                <a:cs typeface="Candara"/>
+              </a:rPr>
+              <a:t> are underway</a:t>
+            </a:r>
+            <a:endParaRPr lang="en-US" dirty="0" smtClean="0">
+              <a:latin typeface="Candara"/>
+              <a:cs typeface="Candara"/>
+            </a:endParaRPr>
+          </a:p>
         </p:txBody>
       </p:sp>
       <p:sp>
@@ -3458,7 +3570,7 @@
         <p:spPr>
           <a:xfrm>
             <a:off x="0" y="3862750"/>
-            <a:ext cx="4561476" cy="369332"/>
+            <a:ext cx="4561476" cy="2585323"/>
           </a:xfrm>
           <a:prstGeom prst="rect">
             <a:avLst/>
@@ -3476,7 +3588,107 @@
                 <a:latin typeface="Candara"/>
                 <a:cs typeface="Candara"/>
               </a:rPr>
-              <a:t>Proposed Solution / Justification</a:t>
+              <a:t>Proposed Solution / </a:t>
+            </a:r>
+            <a:r>
+              <a:rPr lang="en-US" dirty="0" smtClean="0">
+                <a:latin typeface="Candara"/>
+                <a:cs typeface="Candara"/>
+              </a:rPr>
+              <a:t>Justification</a:t>
+            </a:r>
+          </a:p>
+          <a:p>
+            <a:endParaRPr lang="en-US" dirty="0">
+              <a:latin typeface="Candara"/>
+              <a:cs typeface="Candara"/>
+            </a:endParaRPr>
+          </a:p>
+          <a:p>
+            <a:pPr marL="285750" indent="-285750">
+              <a:buFont typeface="Arial"/>
+              <a:buChar char="•"/>
+            </a:pPr>
+            <a:r>
+              <a:rPr lang="en-US" dirty="0" smtClean="0">
+                <a:latin typeface="Candara"/>
+                <a:cs typeface="Candara"/>
+              </a:rPr>
+              <a:t>Temporarily use VICON position data </a:t>
+            </a:r>
+          </a:p>
+          <a:p>
+            <a:pPr marL="285750" indent="-285750">
+              <a:buFont typeface="Arial"/>
+              <a:buChar char="•"/>
+            </a:pPr>
+            <a:r>
+              <a:rPr lang="en-US" dirty="0" smtClean="0">
+                <a:latin typeface="Candara"/>
+                <a:cs typeface="Candara"/>
+              </a:rPr>
+              <a:t>VICON pose is fed into the </a:t>
+            </a:r>
+            <a:r>
+              <a:rPr lang="en-US" dirty="0" err="1" smtClean="0">
+                <a:latin typeface="Candara"/>
+                <a:cs typeface="Candara"/>
+              </a:rPr>
+              <a:t>pixhawk</a:t>
+            </a:r>
+            <a:r>
+              <a:rPr lang="en-US" dirty="0" smtClean="0">
+                <a:latin typeface="Candara"/>
+                <a:cs typeface="Candara"/>
+              </a:rPr>
+              <a:t> and internally fused with barometer</a:t>
+            </a:r>
+          </a:p>
+          <a:p>
+            <a:pPr marL="285750" indent="-285750">
+              <a:buFont typeface="Arial"/>
+              <a:buChar char="•"/>
+            </a:pPr>
+            <a:r>
+              <a:rPr lang="en-US" dirty="0" smtClean="0">
+                <a:latin typeface="Candara"/>
+                <a:cs typeface="Candara"/>
+              </a:rPr>
+              <a:t>Send series of different position and attitude </a:t>
+            </a:r>
+            <a:r>
+              <a:rPr lang="en-US" dirty="0" err="1" smtClean="0">
+                <a:latin typeface="Candara"/>
+                <a:cs typeface="Candara"/>
+              </a:rPr>
+              <a:t>setpoint</a:t>
+            </a:r>
+            <a:r>
+              <a:rPr lang="en-US" dirty="0" err="1" smtClean="0">
+                <a:latin typeface="Candara"/>
+                <a:cs typeface="Candara"/>
+              </a:rPr>
+              <a:t>s</a:t>
+            </a:r>
+            <a:r>
+              <a:rPr lang="en-US" dirty="0" smtClean="0">
+                <a:latin typeface="Candara"/>
+                <a:cs typeface="Candara"/>
+              </a:rPr>
+              <a:t>, verify performance with VICON</a:t>
+            </a:r>
+          </a:p>
+          <a:p>
+            <a:pPr marL="285750" indent="-285750">
+              <a:buFont typeface="Arial"/>
+              <a:buChar char="•"/>
+            </a:pPr>
+            <a:r>
+              <a:rPr lang="en-US" dirty="0" smtClean="0">
+                <a:latin typeface="Candara"/>
+                <a:cs typeface="Candara"/>
+              </a:rPr>
+              <a:t>Use RTAB position in the long run</a:t>
             </a:r>
             <a:endParaRPr lang="en-US" dirty="0" smtClean="0">
               <a:latin typeface="Candara"/>
@@ -3494,7 +3706,7 @@
         <p:spPr>
           <a:xfrm>
             <a:off x="4561476" y="3862750"/>
-            <a:ext cx="4561476" cy="369332"/>
+            <a:ext cx="4561476" cy="2031325"/>
           </a:xfrm>
           <a:prstGeom prst="rect">
             <a:avLst/>
@@ -3512,8 +3724,63 @@
                 <a:latin typeface="Candara"/>
                 <a:cs typeface="Candara"/>
               </a:rPr>
-              <a:t>Path Forward</a:t>
-            </a:r>
+              <a:t>Path </a:t>
+            </a:r>
+            <a:r>
+              <a:rPr lang="en-US" dirty="0" smtClean="0">
+                <a:latin typeface="Candara"/>
+                <a:cs typeface="Candara"/>
+              </a:rPr>
+              <a:t>Forward</a:t>
+            </a:r>
+          </a:p>
+          <a:p>
+            <a:endParaRPr lang="en-US" dirty="0">
+              <a:latin typeface="Candara"/>
+              <a:cs typeface="Candara"/>
+            </a:endParaRPr>
+          </a:p>
+          <a:p>
+            <a:pPr marL="285750" indent="-285750">
+              <a:buFont typeface="Arial"/>
+              <a:buChar char="•"/>
+            </a:pPr>
+            <a:r>
+              <a:rPr lang="en-US" dirty="0">
+                <a:latin typeface="Candara"/>
+                <a:cs typeface="Candara"/>
+              </a:rPr>
+              <a:t>Gain tuning is in progress in tandem with </a:t>
+            </a:r>
+            <a:r>
+              <a:rPr lang="en-US" dirty="0" err="1">
+                <a:latin typeface="Candara"/>
+                <a:cs typeface="Candara"/>
+              </a:rPr>
+              <a:t>pixhawk</a:t>
+            </a:r>
+            <a:r>
+              <a:rPr lang="en-US" dirty="0">
+                <a:latin typeface="Candara"/>
+                <a:cs typeface="Candara"/>
+              </a:rPr>
+              <a:t> simulation from Ed</a:t>
+            </a:r>
+          </a:p>
+          <a:p>
+            <a:pPr marL="285750" indent="-285750">
+              <a:buFont typeface="Arial"/>
+              <a:buChar char="•"/>
+            </a:pPr>
+            <a:r>
+              <a:rPr lang="en-US">
+                <a:latin typeface="Candara"/>
+                <a:cs typeface="Candara"/>
+              </a:rPr>
+              <a:t>Once individual waypoint tracking is reliable, send list of waypoints</a:t>
+            </a:r>
+          </a:p>
+          <a:p>
             <a:endParaRPr lang="en-US" dirty="0">
               <a:latin typeface="Candara"/>
               <a:cs typeface="Candara"/>

</xml_diff>